<commit_message>
Update lesson 1 presentation.
</commit_message>
<xml_diff>
--- a/lessons/1/presentation.pptx
+++ b/lessons/1/presentation.pptx
@@ -2366,7 +2366,7 @@
         <p:spPr>
           <a:xfrm>
             <a:off x="720" y="720"/>
-            <a:ext cx="10078200" cy="7558200"/>
+            <a:ext cx="10077840" cy="7557840"/>
           </a:xfrm>
           <a:prstGeom prst="rect">
             <a:avLst/>
@@ -2582,7 +2582,7 @@
         <p:spPr>
           <a:xfrm>
             <a:off x="720" y="720"/>
-            <a:ext cx="10078200" cy="7558200"/>
+            <a:ext cx="10077840" cy="7557840"/>
           </a:xfrm>
           <a:prstGeom prst="rect">
             <a:avLst/>
@@ -2792,7 +2792,7 @@
         <p:spPr>
           <a:xfrm>
             <a:off x="504000" y="301320"/>
-            <a:ext cx="9070200" cy="1260720"/>
+            <a:ext cx="9069840" cy="1260360"/>
           </a:xfrm>
           <a:prstGeom prst="rect">
             <a:avLst/>
@@ -2824,7 +2824,7 @@
         <p:spPr>
           <a:xfrm>
             <a:off x="504000" y="1563480"/>
-            <a:ext cx="9070200" cy="4383000"/>
+            <a:ext cx="9069840" cy="4382640"/>
           </a:xfrm>
           <a:prstGeom prst="rect">
             <a:avLst/>
@@ -2865,7 +2865,7 @@
         <p:spPr>
           <a:xfrm>
             <a:off x="991080" y="1371600"/>
-            <a:ext cx="8136720" cy="6490800"/>
+            <a:ext cx="8136360" cy="6490440"/>
           </a:xfrm>
           <a:prstGeom prst="rect">
             <a:avLst/>
@@ -2933,7 +2933,7 @@
         <p:spPr>
           <a:xfrm>
             <a:off x="504000" y="576000"/>
-            <a:ext cx="7198560" cy="718560"/>
+            <a:ext cx="7198200" cy="718200"/>
           </a:xfrm>
           <a:prstGeom prst="rect">
             <a:avLst/>
@@ -2965,7 +2965,7 @@
         <p:spPr>
           <a:xfrm>
             <a:off x="504000" y="1769040"/>
-            <a:ext cx="9070200" cy="4383000"/>
+            <a:ext cx="9069840" cy="4382640"/>
           </a:xfrm>
           <a:prstGeom prst="rect">
             <a:avLst/>
@@ -3124,7 +3124,7 @@
         <p:spPr>
           <a:xfrm>
             <a:off x="504000" y="576000"/>
-            <a:ext cx="7198560" cy="718560"/>
+            <a:ext cx="7198200" cy="718200"/>
           </a:xfrm>
           <a:prstGeom prst="rect">
             <a:avLst/>
@@ -3162,7 +3162,7 @@
         <p:spPr>
           <a:xfrm>
             <a:off x="351000" y="1463040"/>
-            <a:ext cx="6322680" cy="3198600"/>
+            <a:ext cx="6322320" cy="3198240"/>
           </a:xfrm>
           <a:prstGeom prst="rect">
             <a:avLst/>
@@ -3187,7 +3187,7 @@
         <p:spPr>
           <a:xfrm>
             <a:off x="4141440" y="2743200"/>
-            <a:ext cx="5458320" cy="4387680"/>
+            <a:ext cx="5457960" cy="4387320"/>
           </a:xfrm>
           <a:prstGeom prst="rect">
             <a:avLst/>
@@ -3255,7 +3255,7 @@
         <p:spPr>
           <a:xfrm>
             <a:off x="504000" y="576000"/>
-            <a:ext cx="7198560" cy="718560"/>
+            <a:ext cx="7198200" cy="718200"/>
           </a:xfrm>
           <a:prstGeom prst="rect">
             <a:avLst/>
@@ -3287,7 +3287,7 @@
         <p:spPr>
           <a:xfrm>
             <a:off x="437760" y="2377440"/>
-            <a:ext cx="9070560" cy="4021920"/>
+            <a:ext cx="9070200" cy="4021560"/>
           </a:xfrm>
           <a:prstGeom prst="rect">
             <a:avLst/>
@@ -3457,7 +3457,7 @@
         <p:spPr>
           <a:xfrm>
             <a:off x="504000" y="576000"/>
-            <a:ext cx="7632720" cy="718560"/>
+            <a:ext cx="7632360" cy="718200"/>
           </a:xfrm>
           <a:prstGeom prst="rect">
             <a:avLst/>
@@ -3489,7 +3489,7 @@
         <p:spPr>
           <a:xfrm>
             <a:off x="504000" y="1800000"/>
-            <a:ext cx="9070560" cy="4383000"/>
+            <a:ext cx="9070200" cy="4382640"/>
           </a:xfrm>
           <a:prstGeom prst="rect">
             <a:avLst/>
@@ -3679,7 +3679,7 @@
               <a:rPr lang="en-US" sz="2600">
                 <a:latin typeface="Arial"/>
               </a:rPr>
-              <a:t>- Некоторые практики из Scrum и Agile</a:t>
+              <a:t>- Некоторые практики из Scrum и XP</a:t>
             </a:r>
             <a:endParaRPr/>
           </a:p>
@@ -3743,7 +3743,7 @@
         <p:spPr>
           <a:xfrm>
             <a:off x="504000" y="576000"/>
-            <a:ext cx="7198560" cy="718560"/>
+            <a:ext cx="7198200" cy="718200"/>
           </a:xfrm>
           <a:prstGeom prst="rect">
             <a:avLst/>
@@ -3781,7 +3781,7 @@
         <p:spPr>
           <a:xfrm>
             <a:off x="940680" y="1799640"/>
-            <a:ext cx="8196480" cy="4382640"/>
+            <a:ext cx="8196120" cy="4382280"/>
           </a:xfrm>
           <a:prstGeom prst="rect">
             <a:avLst/>

</xml_diff>